<commit_message>
using pytest and virtualenv
</commit_message>
<xml_diff>
--- a/docs/rascunho_aula_distancia.pptx
+++ b/docs/rascunho_aula_distancia.pptx
@@ -5,13 +5,14 @@
     <p:sldMasterId id="2147483648" r:id="rId1"/>
   </p:sldMasterIdLst>
   <p:sldIdLst>
-    <p:sldId id="256" r:id="rId2"/>
-    <p:sldId id="257" r:id="rId3"/>
-    <p:sldId id="258" r:id="rId4"/>
-    <p:sldId id="259" r:id="rId5"/>
-    <p:sldId id="262" r:id="rId6"/>
-    <p:sldId id="260" r:id="rId7"/>
-    <p:sldId id="261" r:id="rId8"/>
+    <p:sldId id="263" r:id="rId2"/>
+    <p:sldId id="256" r:id="rId3"/>
+    <p:sldId id="257" r:id="rId4"/>
+    <p:sldId id="258" r:id="rId5"/>
+    <p:sldId id="259" r:id="rId6"/>
+    <p:sldId id="262" r:id="rId7"/>
+    <p:sldId id="260" r:id="rId8"/>
+    <p:sldId id="261" r:id="rId9"/>
   </p:sldIdLst>
   <p:sldSz cx="12192000" cy="6858000"/>
   <p:notesSz cx="6858000" cy="9144000"/>
@@ -267,7 +268,7 @@
           <a:p>
             <a:fld id="{881F5C84-7F6C-8D42-A9BB-148FCD039667}" type="datetimeFigureOut">
               <a:rPr lang="en-BR" smtClean="0"/>
-              <a:t>01/04/20</a:t>
+              <a:t>03/03/21</a:t>
             </a:fld>
             <a:endParaRPr lang="en-BR"/>
           </a:p>
@@ -467,7 +468,7 @@
           <a:p>
             <a:fld id="{881F5C84-7F6C-8D42-A9BB-148FCD039667}" type="datetimeFigureOut">
               <a:rPr lang="en-BR" smtClean="0"/>
-              <a:t>01/04/20</a:t>
+              <a:t>03/03/21</a:t>
             </a:fld>
             <a:endParaRPr lang="en-BR"/>
           </a:p>
@@ -677,7 +678,7 @@
           <a:p>
             <a:fld id="{881F5C84-7F6C-8D42-A9BB-148FCD039667}" type="datetimeFigureOut">
               <a:rPr lang="en-BR" smtClean="0"/>
-              <a:t>01/04/20</a:t>
+              <a:t>03/03/21</a:t>
             </a:fld>
             <a:endParaRPr lang="en-BR"/>
           </a:p>
@@ -877,7 +878,7 @@
           <a:p>
             <a:fld id="{881F5C84-7F6C-8D42-A9BB-148FCD039667}" type="datetimeFigureOut">
               <a:rPr lang="en-BR" smtClean="0"/>
-              <a:t>01/04/20</a:t>
+              <a:t>03/03/21</a:t>
             </a:fld>
             <a:endParaRPr lang="en-BR"/>
           </a:p>
@@ -1153,7 +1154,7 @@
           <a:p>
             <a:fld id="{881F5C84-7F6C-8D42-A9BB-148FCD039667}" type="datetimeFigureOut">
               <a:rPr lang="en-BR" smtClean="0"/>
-              <a:t>01/04/20</a:t>
+              <a:t>03/03/21</a:t>
             </a:fld>
             <a:endParaRPr lang="en-BR"/>
           </a:p>
@@ -1421,7 +1422,7 @@
           <a:p>
             <a:fld id="{881F5C84-7F6C-8D42-A9BB-148FCD039667}" type="datetimeFigureOut">
               <a:rPr lang="en-BR" smtClean="0"/>
-              <a:t>01/04/20</a:t>
+              <a:t>03/03/21</a:t>
             </a:fld>
             <a:endParaRPr lang="en-BR"/>
           </a:p>
@@ -1836,7 +1837,7 @@
           <a:p>
             <a:fld id="{881F5C84-7F6C-8D42-A9BB-148FCD039667}" type="datetimeFigureOut">
               <a:rPr lang="en-BR" smtClean="0"/>
-              <a:t>01/04/20</a:t>
+              <a:t>03/03/21</a:t>
             </a:fld>
             <a:endParaRPr lang="en-BR"/>
           </a:p>
@@ -1978,7 +1979,7 @@
           <a:p>
             <a:fld id="{881F5C84-7F6C-8D42-A9BB-148FCD039667}" type="datetimeFigureOut">
               <a:rPr lang="en-BR" smtClean="0"/>
-              <a:t>01/04/20</a:t>
+              <a:t>03/03/21</a:t>
             </a:fld>
             <a:endParaRPr lang="en-BR"/>
           </a:p>
@@ -2091,7 +2092,7 @@
           <a:p>
             <a:fld id="{881F5C84-7F6C-8D42-A9BB-148FCD039667}" type="datetimeFigureOut">
               <a:rPr lang="en-BR" smtClean="0"/>
-              <a:t>01/04/20</a:t>
+              <a:t>03/03/21</a:t>
             </a:fld>
             <a:endParaRPr lang="en-BR"/>
           </a:p>
@@ -2404,7 +2405,7 @@
           <a:p>
             <a:fld id="{881F5C84-7F6C-8D42-A9BB-148FCD039667}" type="datetimeFigureOut">
               <a:rPr lang="en-BR" smtClean="0"/>
-              <a:t>01/04/20</a:t>
+              <a:t>03/03/21</a:t>
             </a:fld>
             <a:endParaRPr lang="en-BR"/>
           </a:p>
@@ -2693,7 +2694,7 @@
           <a:p>
             <a:fld id="{881F5C84-7F6C-8D42-A9BB-148FCD039667}" type="datetimeFigureOut">
               <a:rPr lang="en-BR" smtClean="0"/>
-              <a:t>01/04/20</a:t>
+              <a:t>03/03/21</a:t>
             </a:fld>
             <a:endParaRPr lang="en-BR"/>
           </a:p>
@@ -2936,7 +2937,7 @@
           <a:p>
             <a:fld id="{881F5C84-7F6C-8D42-A9BB-148FCD039667}" type="datetimeFigureOut">
               <a:rPr lang="en-BR" smtClean="0"/>
-              <a:t>01/04/20</a:t>
+              <a:t>03/03/21</a:t>
             </a:fld>
             <a:endParaRPr lang="en-BR"/>
           </a:p>
@@ -3353,6 +3354,282 @@
           <a:chExt cx="0" cy="0"/>
         </a:xfrm>
       </p:grpSpPr>
+      <p:pic>
+        <p:nvPicPr>
+          <p:cNvPr id="2" name="Picture 1">
+            <a:extLst>
+              <a:ext uri="{FF2B5EF4-FFF2-40B4-BE49-F238E27FC236}">
+                <a16:creationId xmlns:a16="http://schemas.microsoft.com/office/drawing/2014/main" id="{19E8E128-CFB5-5449-95E3-7C4964D7B9C1}"/>
+              </a:ext>
+            </a:extLst>
+          </p:cNvPr>
+          <p:cNvPicPr>
+            <a:picLocks noChangeAspect="1"/>
+          </p:cNvPicPr>
+          <p:nvPr/>
+        </p:nvPicPr>
+        <p:blipFill>
+          <a:blip r:embed="rId2"/>
+          <a:stretch>
+            <a:fillRect/>
+          </a:stretch>
+        </p:blipFill>
+        <p:spPr>
+          <a:xfrm>
+            <a:off x="5108028" y="195097"/>
+            <a:ext cx="1471448" cy="793361"/>
+          </a:xfrm>
+          <a:prstGeom prst="rect">
+            <a:avLst/>
+          </a:prstGeom>
+        </p:spPr>
+      </p:pic>
+      <p:pic>
+        <p:nvPicPr>
+          <p:cNvPr id="3" name="Picture 2">
+            <a:extLst>
+              <a:ext uri="{FF2B5EF4-FFF2-40B4-BE49-F238E27FC236}">
+                <a16:creationId xmlns:a16="http://schemas.microsoft.com/office/drawing/2014/main" id="{90F14A56-8E14-3D4B-A253-81BDA57583C4}"/>
+              </a:ext>
+            </a:extLst>
+          </p:cNvPr>
+          <p:cNvPicPr>
+            <a:picLocks noChangeAspect="1"/>
+          </p:cNvPicPr>
+          <p:nvPr/>
+        </p:nvPicPr>
+        <p:blipFill>
+          <a:blip r:embed="rId3"/>
+          <a:stretch>
+            <a:fillRect/>
+          </a:stretch>
+        </p:blipFill>
+        <p:spPr>
+          <a:xfrm>
+            <a:off x="3267622" y="1298684"/>
+            <a:ext cx="1471448" cy="793361"/>
+          </a:xfrm>
+          <a:prstGeom prst="rect">
+            <a:avLst/>
+          </a:prstGeom>
+        </p:spPr>
+      </p:pic>
+      <p:pic>
+        <p:nvPicPr>
+          <p:cNvPr id="4" name="Picture 3">
+            <a:extLst>
+              <a:ext uri="{FF2B5EF4-FFF2-40B4-BE49-F238E27FC236}">
+                <a16:creationId xmlns:a16="http://schemas.microsoft.com/office/drawing/2014/main" id="{7F2E06A4-AA25-434B-8347-14D23E8ABC26}"/>
+              </a:ext>
+            </a:extLst>
+          </p:cNvPr>
+          <p:cNvPicPr>
+            <a:picLocks noChangeAspect="1"/>
+          </p:cNvPicPr>
+          <p:nvPr/>
+        </p:nvPicPr>
+        <p:blipFill>
+          <a:blip r:embed="rId4"/>
+          <a:stretch>
+            <a:fillRect/>
+          </a:stretch>
+        </p:blipFill>
+        <p:spPr>
+          <a:xfrm>
+            <a:off x="5108028" y="1261553"/>
+            <a:ext cx="1471448" cy="793361"/>
+          </a:xfrm>
+          <a:prstGeom prst="rect">
+            <a:avLst/>
+          </a:prstGeom>
+        </p:spPr>
+      </p:pic>
+      <p:pic>
+        <p:nvPicPr>
+          <p:cNvPr id="5" name="Picture 4">
+            <a:extLst>
+              <a:ext uri="{FF2B5EF4-FFF2-40B4-BE49-F238E27FC236}">
+                <a16:creationId xmlns:a16="http://schemas.microsoft.com/office/drawing/2014/main" id="{DD91DDB2-2C1F-0F40-9FB0-56E66B3729EF}"/>
+              </a:ext>
+            </a:extLst>
+          </p:cNvPr>
+          <p:cNvPicPr>
+            <a:picLocks noChangeAspect="1"/>
+          </p:cNvPicPr>
+          <p:nvPr/>
+        </p:nvPicPr>
+        <p:blipFill>
+          <a:blip r:embed="rId2"/>
+          <a:stretch>
+            <a:fillRect/>
+          </a:stretch>
+        </p:blipFill>
+        <p:spPr>
+          <a:xfrm>
+            <a:off x="7162801" y="1261552"/>
+            <a:ext cx="1471448" cy="793361"/>
+          </a:xfrm>
+          <a:prstGeom prst="rect">
+            <a:avLst/>
+          </a:prstGeom>
+        </p:spPr>
+      </p:pic>
+      <p:cxnSp>
+        <p:nvCxnSpPr>
+          <p:cNvPr id="7" name="Straight Arrow Connector 6">
+            <a:extLst>
+              <a:ext uri="{FF2B5EF4-FFF2-40B4-BE49-F238E27FC236}">
+                <a16:creationId xmlns:a16="http://schemas.microsoft.com/office/drawing/2014/main" id="{9B4C0CBA-7697-984E-9731-36FF359D4E2D}"/>
+              </a:ext>
+            </a:extLst>
+          </p:cNvPr>
+          <p:cNvCxnSpPr>
+            <a:stCxn id="2" idx="1"/>
+            <a:endCxn id="3" idx="0"/>
+          </p:cNvCxnSpPr>
+          <p:nvPr/>
+        </p:nvCxnSpPr>
+        <p:spPr>
+          <a:xfrm flipH="1">
+            <a:off x="4003346" y="591778"/>
+            <a:ext cx="1104682" cy="706906"/>
+          </a:xfrm>
+          <a:prstGeom prst="straightConnector1">
+            <a:avLst/>
+          </a:prstGeom>
+          <a:ln>
+            <a:tailEnd type="triangle"/>
+          </a:ln>
+        </p:spPr>
+        <p:style>
+          <a:lnRef idx="1">
+            <a:schemeClr val="accent1"/>
+          </a:lnRef>
+          <a:fillRef idx="0">
+            <a:schemeClr val="accent1"/>
+          </a:fillRef>
+          <a:effectRef idx="0">
+            <a:schemeClr val="accent1"/>
+          </a:effectRef>
+          <a:fontRef idx="minor">
+            <a:schemeClr val="tx1"/>
+          </a:fontRef>
+        </p:style>
+      </p:cxnSp>
+      <p:cxnSp>
+        <p:nvCxnSpPr>
+          <p:cNvPr id="9" name="Straight Arrow Connector 8">
+            <a:extLst>
+              <a:ext uri="{FF2B5EF4-FFF2-40B4-BE49-F238E27FC236}">
+                <a16:creationId xmlns:a16="http://schemas.microsoft.com/office/drawing/2014/main" id="{682BB056-8433-3644-B5E5-47791AC8967B}"/>
+              </a:ext>
+            </a:extLst>
+          </p:cNvPr>
+          <p:cNvCxnSpPr>
+            <a:stCxn id="2" idx="2"/>
+            <a:endCxn id="4" idx="0"/>
+          </p:cNvCxnSpPr>
+          <p:nvPr/>
+        </p:nvCxnSpPr>
+        <p:spPr>
+          <a:xfrm>
+            <a:off x="5843752" y="988458"/>
+            <a:ext cx="0" cy="273095"/>
+          </a:xfrm>
+          <a:prstGeom prst="straightConnector1">
+            <a:avLst/>
+          </a:prstGeom>
+          <a:ln>
+            <a:tailEnd type="triangle"/>
+          </a:ln>
+        </p:spPr>
+        <p:style>
+          <a:lnRef idx="1">
+            <a:schemeClr val="accent1"/>
+          </a:lnRef>
+          <a:fillRef idx="0">
+            <a:schemeClr val="accent1"/>
+          </a:fillRef>
+          <a:effectRef idx="0">
+            <a:schemeClr val="accent1"/>
+          </a:effectRef>
+          <a:fontRef idx="minor">
+            <a:schemeClr val="tx1"/>
+          </a:fontRef>
+        </p:style>
+      </p:cxnSp>
+      <p:cxnSp>
+        <p:nvCxnSpPr>
+          <p:cNvPr id="11" name="Straight Arrow Connector 10">
+            <a:extLst>
+              <a:ext uri="{FF2B5EF4-FFF2-40B4-BE49-F238E27FC236}">
+                <a16:creationId xmlns:a16="http://schemas.microsoft.com/office/drawing/2014/main" id="{5B892EF2-C3E7-7D4C-BF9A-407687C463B5}"/>
+              </a:ext>
+            </a:extLst>
+          </p:cNvPr>
+          <p:cNvCxnSpPr>
+            <a:stCxn id="2" idx="3"/>
+            <a:endCxn id="5" idx="0"/>
+          </p:cNvCxnSpPr>
+          <p:nvPr/>
+        </p:nvCxnSpPr>
+        <p:spPr>
+          <a:xfrm>
+            <a:off x="6579476" y="591778"/>
+            <a:ext cx="1319049" cy="669774"/>
+          </a:xfrm>
+          <a:prstGeom prst="straightConnector1">
+            <a:avLst/>
+          </a:prstGeom>
+          <a:ln>
+            <a:tailEnd type="triangle"/>
+          </a:ln>
+        </p:spPr>
+        <p:style>
+          <a:lnRef idx="1">
+            <a:schemeClr val="accent1"/>
+          </a:lnRef>
+          <a:fillRef idx="0">
+            <a:schemeClr val="accent1"/>
+          </a:fillRef>
+          <a:effectRef idx="0">
+            <a:schemeClr val="accent1"/>
+          </a:effectRef>
+          <a:fontRef idx="minor">
+            <a:schemeClr val="tx1"/>
+          </a:fontRef>
+        </p:style>
+      </p:cxnSp>
+    </p:spTree>
+    <p:extLst>
+      <p:ext uri="{BB962C8B-B14F-4D97-AF65-F5344CB8AC3E}">
+        <p14:creationId xmlns:p14="http://schemas.microsoft.com/office/powerpoint/2010/main" val="2236554800"/>
+      </p:ext>
+    </p:extLst>
+  </p:cSld>
+  <p:clrMapOvr>
+    <a:masterClrMapping/>
+  </p:clrMapOvr>
+</p:sld>
+</file>
+
+<file path=ppt/slides/slide2.xml><?xml version="1.0" encoding="utf-8"?>
+<p:sld xmlns:a="http://schemas.openxmlformats.org/drawingml/2006/main" xmlns:r="http://schemas.openxmlformats.org/officeDocument/2006/relationships" xmlns:p="http://schemas.openxmlformats.org/presentationml/2006/main">
+  <p:cSld>
+    <p:spTree>
+      <p:nvGrpSpPr>
+        <p:cNvPr id="1" name=""/>
+        <p:cNvGrpSpPr/>
+        <p:nvPr/>
+      </p:nvGrpSpPr>
+      <p:grpSpPr>
+        <a:xfrm>
+          <a:off x="0" y="0"/>
+          <a:ext cx="0" cy="0"/>
+          <a:chOff x="0" y="0"/>
+          <a:chExt cx="0" cy="0"/>
+        </a:xfrm>
+      </p:grpSpPr>
       <p:sp>
         <p:nvSpPr>
           <p:cNvPr id="4" name="Oval 3">
@@ -5334,7 +5611,7 @@
 </p:sld>
 </file>
 
-<file path=ppt/slides/slide2.xml><?xml version="1.0" encoding="utf-8"?>
+<file path=ppt/slides/slide3.xml><?xml version="1.0" encoding="utf-8"?>
 <p:sld xmlns:a="http://schemas.openxmlformats.org/drawingml/2006/main" xmlns:r="http://schemas.openxmlformats.org/officeDocument/2006/relationships" xmlns:p="http://schemas.openxmlformats.org/presentationml/2006/main">
   <p:cSld>
     <p:spTree>
@@ -8597,7 +8874,7 @@
 </p:sld>
 </file>
 
-<file path=ppt/slides/slide3.xml><?xml version="1.0" encoding="utf-8"?>
+<file path=ppt/slides/slide4.xml><?xml version="1.0" encoding="utf-8"?>
 <p:sld xmlns:a="http://schemas.openxmlformats.org/drawingml/2006/main" xmlns:r="http://schemas.openxmlformats.org/officeDocument/2006/relationships" xmlns:p="http://schemas.openxmlformats.org/presentationml/2006/main">
   <p:cSld>
     <p:spTree>
@@ -11760,7 +12037,7 @@
 </p:sld>
 </file>
 
-<file path=ppt/slides/slide4.xml><?xml version="1.0" encoding="utf-8"?>
+<file path=ppt/slides/slide5.xml><?xml version="1.0" encoding="utf-8"?>
 <p:sld xmlns:a="http://schemas.openxmlformats.org/drawingml/2006/main" xmlns:r="http://schemas.openxmlformats.org/officeDocument/2006/relationships" xmlns:p="http://schemas.openxmlformats.org/presentationml/2006/main">
   <p:cSld>
     <p:spTree>
@@ -13925,7 +14202,7 @@
 </p:sld>
 </file>
 
-<file path=ppt/slides/slide5.xml><?xml version="1.0" encoding="utf-8"?>
+<file path=ppt/slides/slide6.xml><?xml version="1.0" encoding="utf-8"?>
 <p:sld xmlns:a="http://schemas.openxmlformats.org/drawingml/2006/main" xmlns:r="http://schemas.openxmlformats.org/officeDocument/2006/relationships" xmlns:p="http://schemas.openxmlformats.org/presentationml/2006/main">
   <p:cSld>
     <p:spTree>
@@ -15755,7 +16032,7 @@
 </p:sld>
 </file>
 
-<file path=ppt/slides/slide6.xml><?xml version="1.0" encoding="utf-8"?>
+<file path=ppt/slides/slide7.xml><?xml version="1.0" encoding="utf-8"?>
 <p:sld xmlns:a="http://schemas.openxmlformats.org/drawingml/2006/main" xmlns:r="http://schemas.openxmlformats.org/officeDocument/2006/relationships" xmlns:p="http://schemas.openxmlformats.org/presentationml/2006/main">
   <p:cSld>
     <p:spTree>
@@ -16715,7 +16992,7 @@
 </p:sld>
 </file>
 
-<file path=ppt/slides/slide7.xml><?xml version="1.0" encoding="utf-8"?>
+<file path=ppt/slides/slide8.xml><?xml version="1.0" encoding="utf-8"?>
 <p:sld xmlns:a="http://schemas.openxmlformats.org/drawingml/2006/main" xmlns:r="http://schemas.openxmlformats.org/officeDocument/2006/relationships" xmlns:p="http://schemas.openxmlformats.org/presentationml/2006/main">
   <p:cSld>
     <p:spTree>

</xml_diff>